<commit_message>
update figures and tex files
</commit_message>
<xml_diff>
--- a/manuscript/asa_template/figures/supplementary/supp_plosone.50clusters.pptx
+++ b/manuscript/asa_template/figures/supplementary/supp_plosone.50clusters.pptx
@@ -6,6 +6,7 @@
   </p:sldMasterIdLst>
   <p:sldIdLst>
     <p:sldId id="256" r:id="rId2"/>
+    <p:sldId id="257" r:id="rId3"/>
   </p:sldIdLst>
   <p:sldSz cx="14711363" cy="4321175"/>
   <p:notesSz cx="6858000" cy="9144000"/>
@@ -104,6 +105,11 @@
       </a:defRPr>
     </a:lvl9pPr>
   </p:defaultTextStyle>
+  <p:extLst>
+    <p:ext uri="{EFAFB233-063F-42B5-8137-9DF3F51BA10A}">
+      <p15:sldGuideLst xmlns:p15="http://schemas.microsoft.com/office/powerpoint/2012/main"/>
+    </p:ext>
+  </p:extLst>
 </p:presentation>
 </file>
 
@@ -238,7 +244,7 @@
           <a:p>
             <a:fld id="{D88D3E18-B164-4438-97AE-8070E0BEB50E}" type="datetimeFigureOut">
               <a:rPr lang="en-AU" smtClean="0"/>
-              <a:t>15/03/2021</a:t>
+              <a:t>21/04/2021</a:t>
             </a:fld>
             <a:endParaRPr lang="en-AU"/>
           </a:p>
@@ -408,7 +414,7 @@
           <a:p>
             <a:fld id="{D88D3E18-B164-4438-97AE-8070E0BEB50E}" type="datetimeFigureOut">
               <a:rPr lang="en-AU" smtClean="0"/>
-              <a:t>15/03/2021</a:t>
+              <a:t>21/04/2021</a:t>
             </a:fld>
             <a:endParaRPr lang="en-AU"/>
           </a:p>
@@ -588,7 +594,7 @@
           <a:p>
             <a:fld id="{D88D3E18-B164-4438-97AE-8070E0BEB50E}" type="datetimeFigureOut">
               <a:rPr lang="en-AU" smtClean="0"/>
-              <a:t>15/03/2021</a:t>
+              <a:t>21/04/2021</a:t>
             </a:fld>
             <a:endParaRPr lang="en-AU"/>
           </a:p>
@@ -758,7 +764,7 @@
           <a:p>
             <a:fld id="{D88D3E18-B164-4438-97AE-8070E0BEB50E}" type="datetimeFigureOut">
               <a:rPr lang="en-AU" smtClean="0"/>
-              <a:t>15/03/2021</a:t>
+              <a:t>21/04/2021</a:t>
             </a:fld>
             <a:endParaRPr lang="en-AU"/>
           </a:p>
@@ -1004,7 +1010,7 @@
           <a:p>
             <a:fld id="{D88D3E18-B164-4438-97AE-8070E0BEB50E}" type="datetimeFigureOut">
               <a:rPr lang="en-AU" smtClean="0"/>
-              <a:t>15/03/2021</a:t>
+              <a:t>21/04/2021</a:t>
             </a:fld>
             <a:endParaRPr lang="en-AU"/>
           </a:p>
@@ -1236,7 +1242,7 @@
           <a:p>
             <a:fld id="{D88D3E18-B164-4438-97AE-8070E0BEB50E}" type="datetimeFigureOut">
               <a:rPr lang="en-AU" smtClean="0"/>
-              <a:t>15/03/2021</a:t>
+              <a:t>21/04/2021</a:t>
             </a:fld>
             <a:endParaRPr lang="en-AU"/>
           </a:p>
@@ -1603,7 +1609,7 @@
           <a:p>
             <a:fld id="{D88D3E18-B164-4438-97AE-8070E0BEB50E}" type="datetimeFigureOut">
               <a:rPr lang="en-AU" smtClean="0"/>
-              <a:t>15/03/2021</a:t>
+              <a:t>21/04/2021</a:t>
             </a:fld>
             <a:endParaRPr lang="en-AU"/>
           </a:p>
@@ -1721,7 +1727,7 @@
           <a:p>
             <a:fld id="{D88D3E18-B164-4438-97AE-8070E0BEB50E}" type="datetimeFigureOut">
               <a:rPr lang="en-AU" smtClean="0"/>
-              <a:t>15/03/2021</a:t>
+              <a:t>21/04/2021</a:t>
             </a:fld>
             <a:endParaRPr lang="en-AU"/>
           </a:p>
@@ -1816,7 +1822,7 @@
           <a:p>
             <a:fld id="{D88D3E18-B164-4438-97AE-8070E0BEB50E}" type="datetimeFigureOut">
               <a:rPr lang="en-AU" smtClean="0"/>
-              <a:t>15/03/2021</a:t>
+              <a:t>21/04/2021</a:t>
             </a:fld>
             <a:endParaRPr lang="en-AU"/>
           </a:p>
@@ -2093,7 +2099,7 @@
           <a:p>
             <a:fld id="{D88D3E18-B164-4438-97AE-8070E0BEB50E}" type="datetimeFigureOut">
               <a:rPr lang="en-AU" smtClean="0"/>
-              <a:t>15/03/2021</a:t>
+              <a:t>21/04/2021</a:t>
             </a:fld>
             <a:endParaRPr lang="en-AU"/>
           </a:p>
@@ -2350,7 +2356,7 @@
           <a:p>
             <a:fld id="{D88D3E18-B164-4438-97AE-8070E0BEB50E}" type="datetimeFigureOut">
               <a:rPr lang="en-AU" smtClean="0"/>
-              <a:t>15/03/2021</a:t>
+              <a:t>21/04/2021</a:t>
             </a:fld>
             <a:endParaRPr lang="en-AU"/>
           </a:p>
@@ -2563,7 +2569,7 @@
           <a:p>
             <a:fld id="{D88D3E18-B164-4438-97AE-8070E0BEB50E}" type="datetimeFigureOut">
               <a:rPr lang="en-AU" smtClean="0"/>
-              <a:t>15/03/2021</a:t>
+              <a:t>21/04/2021</a:t>
             </a:fld>
             <a:endParaRPr lang="en-AU"/>
           </a:p>
@@ -3194,6 +3200,231 @@
 </p:sld>
 </file>
 
+<file path=ppt/slides/slide2.xml><?xml version="1.0" encoding="utf-8"?>
+<p:sld xmlns:a="http://schemas.openxmlformats.org/drawingml/2006/main" xmlns:r="http://schemas.openxmlformats.org/officeDocument/2006/relationships" xmlns:p="http://schemas.openxmlformats.org/presentationml/2006/main">
+  <p:cSld>
+    <p:spTree>
+      <p:nvGrpSpPr>
+        <p:cNvPr id="1" name=""/>
+        <p:cNvGrpSpPr/>
+        <p:nvPr/>
+      </p:nvGrpSpPr>
+      <p:grpSpPr>
+        <a:xfrm>
+          <a:off x="0" y="0"/>
+          <a:ext cx="0" cy="0"/>
+          <a:chOff x="0" y="0"/>
+          <a:chExt cx="0" cy="0"/>
+        </a:xfrm>
+      </p:grpSpPr>
+      <p:sp>
+        <p:nvSpPr>
+          <p:cNvPr id="10" name="TextBox 9">
+            <a:extLst>
+              <a:ext uri="{FF2B5EF4-FFF2-40B4-BE49-F238E27FC236}">
+                <a16:creationId xmlns:a16="http://schemas.microsoft.com/office/drawing/2014/main" id="{48BEC56A-CE30-49E3-8279-E30C38B35AF1}"/>
+              </a:ext>
+            </a:extLst>
+          </p:cNvPr>
+          <p:cNvSpPr txBox="1"/>
+          <p:nvPr/>
+        </p:nvSpPr>
+        <p:spPr>
+          <a:xfrm>
+            <a:off x="191911" y="169333"/>
+            <a:ext cx="372533" cy="369332"/>
+          </a:xfrm>
+          <a:prstGeom prst="rect">
+            <a:avLst/>
+          </a:prstGeom>
+          <a:noFill/>
+        </p:spPr>
+        <p:txBody>
+          <a:bodyPr wrap="square" rtlCol="0">
+            <a:spAutoFit/>
+          </a:bodyPr>
+          <a:lstStyle/>
+          <a:p>
+            <a:r>
+              <a:rPr lang="en-AU" b="1" dirty="0"/>
+              <a:t>A</a:t>
+            </a:r>
+          </a:p>
+        </p:txBody>
+      </p:sp>
+      <p:sp>
+        <p:nvSpPr>
+          <p:cNvPr id="17" name="TextBox 16">
+            <a:extLst>
+              <a:ext uri="{FF2B5EF4-FFF2-40B4-BE49-F238E27FC236}">
+                <a16:creationId xmlns:a16="http://schemas.microsoft.com/office/drawing/2014/main" id="{1CE3991C-20C0-4AD8-9371-A634ED9B3CFD}"/>
+              </a:ext>
+            </a:extLst>
+          </p:cNvPr>
+          <p:cNvSpPr txBox="1"/>
+          <p:nvPr/>
+        </p:nvSpPr>
+        <p:spPr>
+          <a:xfrm>
+            <a:off x="5129671" y="159051"/>
+            <a:ext cx="372533" cy="369332"/>
+          </a:xfrm>
+          <a:prstGeom prst="rect">
+            <a:avLst/>
+          </a:prstGeom>
+          <a:noFill/>
+        </p:spPr>
+        <p:txBody>
+          <a:bodyPr wrap="square" rtlCol="0">
+            <a:spAutoFit/>
+          </a:bodyPr>
+          <a:lstStyle/>
+          <a:p>
+            <a:r>
+              <a:rPr lang="en-AU" b="1" dirty="0"/>
+              <a:t>B</a:t>
+            </a:r>
+          </a:p>
+        </p:txBody>
+      </p:sp>
+      <p:sp>
+        <p:nvSpPr>
+          <p:cNvPr id="22" name="TextBox 21">
+            <a:extLst>
+              <a:ext uri="{FF2B5EF4-FFF2-40B4-BE49-F238E27FC236}">
+                <a16:creationId xmlns:a16="http://schemas.microsoft.com/office/drawing/2014/main" id="{00613426-96B7-49AA-8142-9CA71360B9C2}"/>
+              </a:ext>
+            </a:extLst>
+          </p:cNvPr>
+          <p:cNvSpPr txBox="1"/>
+          <p:nvPr/>
+        </p:nvSpPr>
+        <p:spPr>
+          <a:xfrm>
+            <a:off x="9881164" y="159051"/>
+            <a:ext cx="372533" cy="369332"/>
+          </a:xfrm>
+          <a:prstGeom prst="rect">
+            <a:avLst/>
+          </a:prstGeom>
+          <a:noFill/>
+        </p:spPr>
+        <p:txBody>
+          <a:bodyPr wrap="square" rtlCol="0">
+            <a:spAutoFit/>
+          </a:bodyPr>
+          <a:lstStyle/>
+          <a:p>
+            <a:r>
+              <a:rPr lang="en-AU" b="1" dirty="0"/>
+              <a:t>C</a:t>
+            </a:r>
+          </a:p>
+        </p:txBody>
+      </p:sp>
+      <p:pic>
+        <p:nvPicPr>
+          <p:cNvPr id="3" name="Picture 2">
+            <a:extLst>
+              <a:ext uri="{FF2B5EF4-FFF2-40B4-BE49-F238E27FC236}">
+                <a16:creationId xmlns:a16="http://schemas.microsoft.com/office/drawing/2014/main" id="{983398B9-13D1-4263-9F45-81E9A5BAA3FE}"/>
+              </a:ext>
+            </a:extLst>
+          </p:cNvPr>
+          <p:cNvPicPr>
+            <a:picLocks noChangeAspect="1"/>
+          </p:cNvPicPr>
+          <p:nvPr/>
+        </p:nvPicPr>
+        <p:blipFill>
+          <a:blip r:embed="rId2"/>
+          <a:stretch>
+            <a:fillRect/>
+          </a:stretch>
+        </p:blipFill>
+        <p:spPr>
+          <a:xfrm>
+            <a:off x="1" y="681158"/>
+            <a:ext cx="4601718" cy="2811780"/>
+          </a:xfrm>
+          <a:prstGeom prst="rect">
+            <a:avLst/>
+          </a:prstGeom>
+        </p:spPr>
+      </p:pic>
+      <p:pic>
+        <p:nvPicPr>
+          <p:cNvPr id="6" name="Picture 5">
+            <a:extLst>
+              <a:ext uri="{FF2B5EF4-FFF2-40B4-BE49-F238E27FC236}">
+                <a16:creationId xmlns:a16="http://schemas.microsoft.com/office/drawing/2014/main" id="{6AA3E07F-AC2B-4399-93B0-E9B3EBB80355}"/>
+              </a:ext>
+            </a:extLst>
+          </p:cNvPr>
+          <p:cNvPicPr>
+            <a:picLocks noChangeAspect="1"/>
+          </p:cNvPicPr>
+          <p:nvPr/>
+        </p:nvPicPr>
+        <p:blipFill>
+          <a:blip r:embed="rId3"/>
+          <a:stretch>
+            <a:fillRect/>
+          </a:stretch>
+        </p:blipFill>
+        <p:spPr>
+          <a:xfrm>
+            <a:off x="4842428" y="681158"/>
+            <a:ext cx="4581144" cy="2763774"/>
+          </a:xfrm>
+          <a:prstGeom prst="rect">
+            <a:avLst/>
+          </a:prstGeom>
+        </p:spPr>
+      </p:pic>
+      <p:pic>
+        <p:nvPicPr>
+          <p:cNvPr id="11" name="Picture 10">
+            <a:extLst>
+              <a:ext uri="{FF2B5EF4-FFF2-40B4-BE49-F238E27FC236}">
+                <a16:creationId xmlns:a16="http://schemas.microsoft.com/office/drawing/2014/main" id="{D3CF7FB0-2ADD-488D-83DF-66F90AB1C63D}"/>
+              </a:ext>
+            </a:extLst>
+          </p:cNvPr>
+          <p:cNvPicPr>
+            <a:picLocks noChangeAspect="1"/>
+          </p:cNvPicPr>
+          <p:nvPr/>
+        </p:nvPicPr>
+        <p:blipFill>
+          <a:blip r:embed="rId4"/>
+          <a:stretch>
+            <a:fillRect/>
+          </a:stretch>
+        </p:blipFill>
+        <p:spPr>
+          <a:xfrm>
+            <a:off x="9578607" y="681160"/>
+            <a:ext cx="4690872" cy="2770632"/>
+          </a:xfrm>
+          <a:prstGeom prst="rect">
+            <a:avLst/>
+          </a:prstGeom>
+        </p:spPr>
+      </p:pic>
+    </p:spTree>
+    <p:extLst>
+      <p:ext uri="{BB962C8B-B14F-4D97-AF65-F5344CB8AC3E}">
+        <p14:creationId xmlns:p14="http://schemas.microsoft.com/office/powerpoint/2010/main" val="1909398769"/>
+      </p:ext>
+    </p:extLst>
+  </p:cSld>
+  <p:clrMapOvr>
+    <a:masterClrMapping/>
+  </p:clrMapOvr>
+</p:sld>
+</file>
+
 <file path=ppt/theme/theme1.xml><?xml version="1.0" encoding="utf-8"?>
 <a:theme xmlns:a="http://schemas.openxmlformats.org/drawingml/2006/main" name="Office Theme">
   <a:themeElements>

</xml_diff>